<commit_message>
Added QR code to github account
</commit_message>
<xml_diff>
--- a/presentation.pptx
+++ b/presentation.pptx
@@ -118,7 +118,7 @@
 <file path=ppt/revisionInfo.xml><?xml version="1.0" encoding="utf-8"?>
 <p1510:revInfo xmlns:a="http://schemas.openxmlformats.org/drawingml/2006/main" xmlns:r="http://schemas.openxmlformats.org/officeDocument/2006/relationships" xmlns:p1510="http://schemas.microsoft.com/office/powerpoint/2015/10/main">
   <p1510:revLst>
-    <p1510:client id="{D4467163-BDB5-4A80-BBD4-4CFBF9737BB9}" v="106" dt="2023-06-06T23:44:16.121"/>
+    <p1510:client id="{D4467163-BDB5-4A80-BBD4-4CFBF9737BB9}" v="108" dt="2023-06-07T00:14:46.346"/>
   </p1510:revLst>
 </p1510:revInfo>
 </file>
@@ -128,7 +128,7 @@
   <pc:docChgLst>
     <pc:chgData name="Nick Xonis" userId="6c6c1556891b75f7" providerId="LiveId" clId="{D4467163-BDB5-4A80-BBD4-4CFBF9737BB9}"/>
     <pc:docChg chg="undo redo custSel addSld modSld">
-      <pc:chgData name="Nick Xonis" userId="6c6c1556891b75f7" providerId="LiveId" clId="{D4467163-BDB5-4A80-BBD4-4CFBF9737BB9}" dt="2023-06-06T23:49:55.802" v="2307" actId="26606"/>
+      <pc:chgData name="Nick Xonis" userId="6c6c1556891b75f7" providerId="LiveId" clId="{D4467163-BDB5-4A80-BBD4-4CFBF9737BB9}" dt="2023-06-07T00:15:09.100" v="2365" actId="26606"/>
       <pc:docMkLst>
         <pc:docMk/>
       </pc:docMkLst>
@@ -1550,13 +1550,13 @@
         </pc:spChg>
       </pc:sldChg>
       <pc:sldChg chg="addSp delSp modSp new mod setBg">
-        <pc:chgData name="Nick Xonis" userId="6c6c1556891b75f7" providerId="LiveId" clId="{D4467163-BDB5-4A80-BBD4-4CFBF9737BB9}" dt="2023-06-06T23:49:55.802" v="2307" actId="26606"/>
+        <pc:chgData name="Nick Xonis" userId="6c6c1556891b75f7" providerId="LiveId" clId="{D4467163-BDB5-4A80-BBD4-4CFBF9737BB9}" dt="2023-06-07T00:15:09.100" v="2365" actId="26606"/>
         <pc:sldMkLst>
           <pc:docMk/>
           <pc:sldMk cId="1596460694" sldId="263"/>
         </pc:sldMkLst>
         <pc:spChg chg="mod">
-          <ac:chgData name="Nick Xonis" userId="6c6c1556891b75f7" providerId="LiveId" clId="{D4467163-BDB5-4A80-BBD4-4CFBF9737BB9}" dt="2023-06-06T23:49:55.802" v="2307" actId="26606"/>
+          <ac:chgData name="Nick Xonis" userId="6c6c1556891b75f7" providerId="LiveId" clId="{D4467163-BDB5-4A80-BBD4-4CFBF9737BB9}" dt="2023-06-07T00:15:09.100" v="2365" actId="26606"/>
           <ac:spMkLst>
             <pc:docMk/>
             <pc:sldMk cId="1596460694" sldId="263"/>
@@ -1571,38 +1571,102 @@
             <ac:spMk id="3" creationId="{4AF03D91-1F37-57DE-1D13-2C0524F74521}"/>
           </ac:spMkLst>
         </pc:spChg>
-        <pc:spChg chg="add">
-          <ac:chgData name="Nick Xonis" userId="6c6c1556891b75f7" providerId="LiveId" clId="{D4467163-BDB5-4A80-BBD4-4CFBF9737BB9}" dt="2023-06-06T23:49:55.802" v="2307" actId="26606"/>
+        <pc:spChg chg="add mod">
+          <ac:chgData name="Nick Xonis" userId="6c6c1556891b75f7" providerId="LiveId" clId="{D4467163-BDB5-4A80-BBD4-4CFBF9737BB9}" dt="2023-06-07T00:15:09.100" v="2365" actId="26606"/>
+          <ac:spMkLst>
+            <pc:docMk/>
+            <pc:sldMk cId="1596460694" sldId="263"/>
+            <ac:spMk id="6" creationId="{5708AFCB-BFB0-9917-8879-A81EE37D3572}"/>
+          </ac:spMkLst>
+        </pc:spChg>
+        <pc:spChg chg="add del">
+          <ac:chgData name="Nick Xonis" userId="6c6c1556891b75f7" providerId="LiveId" clId="{D4467163-BDB5-4A80-BBD4-4CFBF9737BB9}" dt="2023-06-07T00:14:26.994" v="2314" actId="26606"/>
           <ac:spMkLst>
             <pc:docMk/>
             <pc:sldMk cId="1596460694" sldId="263"/>
             <ac:spMk id="7" creationId="{FFD48BC7-DC40-47DE-87EE-9F4B6ECB9ABB}"/>
           </ac:spMkLst>
         </pc:spChg>
-        <pc:spChg chg="add">
-          <ac:chgData name="Nick Xonis" userId="6c6c1556891b75f7" providerId="LiveId" clId="{D4467163-BDB5-4A80-BBD4-4CFBF9737BB9}" dt="2023-06-06T23:49:55.802" v="2307" actId="26606"/>
+        <pc:spChg chg="add del">
+          <ac:chgData name="Nick Xonis" userId="6c6c1556891b75f7" providerId="LiveId" clId="{D4467163-BDB5-4A80-BBD4-4CFBF9737BB9}" dt="2023-06-07T00:14:26.994" v="2314" actId="26606"/>
           <ac:spMkLst>
             <pc:docMk/>
             <pc:sldMk cId="1596460694" sldId="263"/>
             <ac:spMk id="9" creationId="{E502BBC7-2C76-46F3-BC24-5985BC13DB88}"/>
           </ac:spMkLst>
         </pc:spChg>
-        <pc:spChg chg="add">
-          <ac:chgData name="Nick Xonis" userId="6c6c1556891b75f7" providerId="LiveId" clId="{D4467163-BDB5-4A80-BBD4-4CFBF9737BB9}" dt="2023-06-06T23:49:55.802" v="2307" actId="26606"/>
+        <pc:spChg chg="add del">
+          <ac:chgData name="Nick Xonis" userId="6c6c1556891b75f7" providerId="LiveId" clId="{D4467163-BDB5-4A80-BBD4-4CFBF9737BB9}" dt="2023-06-07T00:14:26.994" v="2314" actId="26606"/>
           <ac:spMkLst>
             <pc:docMk/>
             <pc:sldMk cId="1596460694" sldId="263"/>
             <ac:spMk id="11" creationId="{C7F28D52-2A5F-4D23-81AE-7CB8B591C7AF}"/>
           </ac:spMkLst>
         </pc:spChg>
-        <pc:spChg chg="add">
-          <ac:chgData name="Nick Xonis" userId="6c6c1556891b75f7" providerId="LiveId" clId="{D4467163-BDB5-4A80-BBD4-4CFBF9737BB9}" dt="2023-06-06T23:49:55.802" v="2307" actId="26606"/>
+        <pc:spChg chg="add del">
+          <ac:chgData name="Nick Xonis" userId="6c6c1556891b75f7" providerId="LiveId" clId="{D4467163-BDB5-4A80-BBD4-4CFBF9737BB9}" dt="2023-06-07T00:14:26.994" v="2314" actId="26606"/>
           <ac:spMkLst>
             <pc:docMk/>
             <pc:sldMk cId="1596460694" sldId="263"/>
             <ac:spMk id="13" creationId="{3629484E-3792-4B3D-89AD-7C8A1ED0E0D4}"/>
           </ac:spMkLst>
         </pc:spChg>
+        <pc:spChg chg="add del">
+          <ac:chgData name="Nick Xonis" userId="6c6c1556891b75f7" providerId="LiveId" clId="{D4467163-BDB5-4A80-BBD4-4CFBF9737BB9}" dt="2023-06-07T00:14:26.991" v="2313" actId="26606"/>
+          <ac:spMkLst>
+            <pc:docMk/>
+            <pc:sldMk cId="1596460694" sldId="263"/>
+            <ac:spMk id="18" creationId="{93245F62-CCC4-49E4-B95B-EA6C1E790510}"/>
+          </ac:spMkLst>
+        </pc:spChg>
+        <pc:spChg chg="add del">
+          <ac:chgData name="Nick Xonis" userId="6c6c1556891b75f7" providerId="LiveId" clId="{D4467163-BDB5-4A80-BBD4-4CFBF9737BB9}" dt="2023-06-07T00:14:26.991" v="2313" actId="26606"/>
+          <ac:spMkLst>
+            <pc:docMk/>
+            <pc:sldMk cId="1596460694" sldId="263"/>
+            <ac:spMk id="20" creationId="{E6C0DD6B-6AA3-448F-9B99-8386295BC1B4}"/>
+          </ac:spMkLst>
+        </pc:spChg>
+        <pc:spChg chg="add del">
+          <ac:chgData name="Nick Xonis" userId="6c6c1556891b75f7" providerId="LiveId" clId="{D4467163-BDB5-4A80-BBD4-4CFBF9737BB9}" dt="2023-06-07T00:15:09.100" v="2365" actId="26606"/>
+          <ac:spMkLst>
+            <pc:docMk/>
+            <pc:sldMk cId="1596460694" sldId="263"/>
+            <ac:spMk id="22" creationId="{337940BB-FBC4-492E-BD92-3B7B914D0EAE}"/>
+          </ac:spMkLst>
+        </pc:spChg>
+        <pc:spChg chg="add del">
+          <ac:chgData name="Nick Xonis" userId="6c6c1556891b75f7" providerId="LiveId" clId="{D4467163-BDB5-4A80-BBD4-4CFBF9737BB9}" dt="2023-06-07T00:15:09.100" v="2365" actId="26606"/>
+          <ac:spMkLst>
+            <pc:docMk/>
+            <pc:sldMk cId="1596460694" sldId="263"/>
+            <ac:spMk id="23" creationId="{3FCFB1DE-0B7E-48CC-BA90-B2AB0889F9D6}"/>
+          </ac:spMkLst>
+        </pc:spChg>
+        <pc:spChg chg="add">
+          <ac:chgData name="Nick Xonis" userId="6c6c1556891b75f7" providerId="LiveId" clId="{D4467163-BDB5-4A80-BBD4-4CFBF9737BB9}" dt="2023-06-07T00:15:09.100" v="2365" actId="26606"/>
+          <ac:spMkLst>
+            <pc:docMk/>
+            <pc:sldMk cId="1596460694" sldId="263"/>
+            <ac:spMk id="28" creationId="{743AA782-23D1-4521-8CAD-47662984AA08}"/>
+          </ac:spMkLst>
+        </pc:spChg>
+        <pc:spChg chg="add">
+          <ac:chgData name="Nick Xonis" userId="6c6c1556891b75f7" providerId="LiveId" clId="{D4467163-BDB5-4A80-BBD4-4CFBF9737BB9}" dt="2023-06-07T00:15:09.100" v="2365" actId="26606"/>
+          <ac:spMkLst>
+            <pc:docMk/>
+            <pc:sldMk cId="1596460694" sldId="263"/>
+            <ac:spMk id="30" creationId="{650D18FE-0824-4A46-B22C-A86B52E5780A}"/>
+          </ac:spMkLst>
+        </pc:spChg>
+        <pc:picChg chg="add mod ord">
+          <ac:chgData name="Nick Xonis" userId="6c6c1556891b75f7" providerId="LiveId" clId="{D4467163-BDB5-4A80-BBD4-4CFBF9737BB9}" dt="2023-06-07T00:15:09.100" v="2365" actId="26606"/>
+          <ac:picMkLst>
+            <pc:docMk/>
+            <pc:sldMk cId="1596460694" sldId="263"/>
+            <ac:picMk id="5" creationId="{0EC74EC0-85CC-5874-5185-8AA0EC5E89CA}"/>
+          </ac:picMkLst>
+        </pc:picChg>
       </pc:sldChg>
       <pc:sldChg chg="addSp delSp modSp new mod setBg">
         <pc:chgData name="Nick Xonis" userId="6c6c1556891b75f7" providerId="LiveId" clId="{D4467163-BDB5-4A80-BBD4-4CFBF9737BB9}" dt="2023-06-06T23:45:13.425" v="2305" actId="26606"/>
@@ -9921,10 +9985,10 @@
       </p:grpSpPr>
       <p:sp useBgFill="1">
         <p:nvSpPr>
-          <p:cNvPr id="7" name="Rectangle 6">
+          <p:cNvPr id="28" name="Rectangle 27">
             <a:extLst>
               <a:ext uri="{FF2B5EF4-FFF2-40B4-BE49-F238E27FC236}">
-                <a16:creationId xmlns:a16="http://schemas.microsoft.com/office/drawing/2014/main" id="{FFD48BC7-DC40-47DE-87EE-9F4B6ECB9ABB}"/>
+                <a16:creationId xmlns:a16="http://schemas.microsoft.com/office/drawing/2014/main" id="{743AA782-23D1-4521-8CAD-47662984AA08}"/>
               </a:ext>
               <a:ext uri="{C183D7F6-B498-43B3-948B-1728B52AA6E4}">
                 <adec:decorative xmlns:adec="http://schemas.microsoft.com/office/drawing/2017/decorative" val="1"/>
@@ -9979,12 +10043,54 @@
           </a:p>
         </p:txBody>
       </p:sp>
-      <p:sp useBgFill="1">
+      <p:sp>
         <p:nvSpPr>
-          <p:cNvPr id="9" name="Freeform: Shape 8">
+          <p:cNvPr id="2" name="Заголовок 1">
             <a:extLst>
               <a:ext uri="{FF2B5EF4-FFF2-40B4-BE49-F238E27FC236}">
-                <a16:creationId xmlns:a16="http://schemas.microsoft.com/office/drawing/2014/main" id="{E502BBC7-2C76-46F3-BC24-5985BC13DB88}"/>
+                <a16:creationId xmlns:a16="http://schemas.microsoft.com/office/drawing/2014/main" id="{EF867D5F-8842-00AE-AA95-6DDBCB7E8EEB}"/>
+              </a:ext>
+            </a:extLst>
+          </p:cNvPr>
+          <p:cNvSpPr>
+            <a:spLocks noGrp="1"/>
+          </p:cNvSpPr>
+          <p:nvPr>
+            <p:ph type="title"/>
+          </p:nvPr>
+        </p:nvSpPr>
+        <p:spPr>
+          <a:xfrm>
+            <a:off x="630936" y="640080"/>
+            <a:ext cx="4818888" cy="1481328"/>
+          </a:xfrm>
+        </p:spPr>
+        <p:txBody>
+          <a:bodyPr vert="horz" lIns="91440" tIns="45720" rIns="91440" bIns="45720" rtlCol="0" anchor="b">
+            <a:normAutofit/>
+          </a:bodyPr>
+          <a:lstStyle/>
+          <a:p>
+            <a:r>
+              <a:rPr lang="en-US" sz="5400" kern="1200">
+                <a:solidFill>
+                  <a:schemeClr val="tx1"/>
+                </a:solidFill>
+                <a:latin typeface="+mj-lt"/>
+                <a:ea typeface="+mj-ea"/>
+                <a:cs typeface="+mj-cs"/>
+              </a:rPr>
+              <a:t>Дякую за увагу</a:t>
+            </a:r>
+          </a:p>
+        </p:txBody>
+      </p:sp>
+      <p:sp>
+        <p:nvSpPr>
+          <p:cNvPr id="30" name="sketch line">
+            <a:extLst>
+              <a:ext uri="{FF2B5EF4-FFF2-40B4-BE49-F238E27FC236}">
+                <a16:creationId xmlns:a16="http://schemas.microsoft.com/office/drawing/2014/main" id="{650D18FE-0824-4A46-B22C-A86B52E5780A}"/>
               </a:ext>
               <a:ext uri="{C183D7F6-B498-43B3-948B-1728B52AA6E4}">
                 <adec:decorative xmlns:adec="http://schemas.microsoft.com/office/drawing/2017/decorative" val="1"/>
@@ -10004,32 +10110,36 @@
         </p:nvSpPr>
         <p:spPr>
           <a:xfrm>
-            <a:off x="1114425" y="0"/>
-            <a:ext cx="9963150" cy="6858000"/>
+            <a:off x="643278" y="2372868"/>
+            <a:ext cx="3255095" cy="18288"/>
           </a:xfrm>
           <a:custGeom>
             <a:avLst/>
             <a:gdLst>
-              <a:gd name="connsiteX0" fmla="*/ 1595771 w 9963150"/>
-              <a:gd name="connsiteY0" fmla="*/ 0 h 6858000"/>
-              <a:gd name="connsiteX1" fmla="*/ 8367379 w 9963150"/>
-              <a:gd name="connsiteY1" fmla="*/ 0 h 6858000"/>
-              <a:gd name="connsiteX2" fmla="*/ 8504080 w 9963150"/>
-              <a:gd name="connsiteY2" fmla="*/ 130333 h 6858000"/>
-              <a:gd name="connsiteX3" fmla="*/ 9963150 w 9963150"/>
-              <a:gd name="connsiteY3" fmla="*/ 3652838 h 6858000"/>
-              <a:gd name="connsiteX4" fmla="*/ 8825600 w 9963150"/>
-              <a:gd name="connsiteY4" fmla="*/ 6821583 h 6858000"/>
-              <a:gd name="connsiteX5" fmla="*/ 8794055 w 9963150"/>
-              <a:gd name="connsiteY5" fmla="*/ 6858000 h 6858000"/>
-              <a:gd name="connsiteX6" fmla="*/ 1169096 w 9963150"/>
-              <a:gd name="connsiteY6" fmla="*/ 6858000 h 6858000"/>
-              <a:gd name="connsiteX7" fmla="*/ 1137550 w 9963150"/>
-              <a:gd name="connsiteY7" fmla="*/ 6821583 h 6858000"/>
-              <a:gd name="connsiteX8" fmla="*/ 0 w 9963150"/>
-              <a:gd name="connsiteY8" fmla="*/ 3652838 h 6858000"/>
-              <a:gd name="connsiteX9" fmla="*/ 1459070 w 9963150"/>
-              <a:gd name="connsiteY9" fmla="*/ 130333 h 6858000"/>
+              <a:gd name="connsiteX0" fmla="*/ 0 w 3255095"/>
+              <a:gd name="connsiteY0" fmla="*/ 0 h 18288"/>
+              <a:gd name="connsiteX1" fmla="*/ 618468 w 3255095"/>
+              <a:gd name="connsiteY1" fmla="*/ 0 h 18288"/>
+              <a:gd name="connsiteX2" fmla="*/ 1269487 w 3255095"/>
+              <a:gd name="connsiteY2" fmla="*/ 0 h 18288"/>
+              <a:gd name="connsiteX3" fmla="*/ 1953057 w 3255095"/>
+              <a:gd name="connsiteY3" fmla="*/ 0 h 18288"/>
+              <a:gd name="connsiteX4" fmla="*/ 2636627 w 3255095"/>
+              <a:gd name="connsiteY4" fmla="*/ 0 h 18288"/>
+              <a:gd name="connsiteX5" fmla="*/ 3255095 w 3255095"/>
+              <a:gd name="connsiteY5" fmla="*/ 0 h 18288"/>
+              <a:gd name="connsiteX6" fmla="*/ 3255095 w 3255095"/>
+              <a:gd name="connsiteY6" fmla="*/ 18288 h 18288"/>
+              <a:gd name="connsiteX7" fmla="*/ 2538974 w 3255095"/>
+              <a:gd name="connsiteY7" fmla="*/ 18288 h 18288"/>
+              <a:gd name="connsiteX8" fmla="*/ 1822853 w 3255095"/>
+              <a:gd name="connsiteY8" fmla="*/ 18288 h 18288"/>
+              <a:gd name="connsiteX9" fmla="*/ 1171834 w 3255095"/>
+              <a:gd name="connsiteY9" fmla="*/ 18288 h 18288"/>
+              <a:gd name="connsiteX10" fmla="*/ 0 w 3255095"/>
+              <a:gd name="connsiteY10" fmla="*/ 18288 h 18288"/>
+              <a:gd name="connsiteX11" fmla="*/ 0 w 3255095"/>
+              <a:gd name="connsiteY11" fmla="*/ 0 h 18288"/>
             </a:gdLst>
             <a:ahLst/>
             <a:cxnLst>
@@ -10063,392 +10173,164 @@
               <a:cxn ang="0">
                 <a:pos x="connsiteX9" y="connsiteY9"/>
               </a:cxn>
+              <a:cxn ang="0">
+                <a:pos x="connsiteX10" y="connsiteY10"/>
+              </a:cxn>
+              <a:cxn ang="0">
+                <a:pos x="connsiteX11" y="connsiteY11"/>
+              </a:cxn>
             </a:cxnLst>
             <a:rect l="l" t="t" r="r" b="b"/>
             <a:pathLst>
-              <a:path w="9963150" h="6858000">
+              <a:path w="3255095" h="18288" fill="none" extrusionOk="0">
                 <a:moveTo>
-                  <a:pt x="1595771" y="0"/>
+                  <a:pt x="0" y="0"/>
                 </a:moveTo>
-                <a:lnTo>
-                  <a:pt x="8367379" y="0"/>
-                </a:lnTo>
-                <a:lnTo>
-                  <a:pt x="8504080" y="130333"/>
-                </a:lnTo>
-                <a:cubicBezTo>
-                  <a:pt x="9405568" y="1031820"/>
-                  <a:pt x="9963150" y="2277214"/>
-                  <a:pt x="9963150" y="3652838"/>
-                </a:cubicBezTo>
-                <a:cubicBezTo>
-                  <a:pt x="9963150" y="4856509"/>
-                  <a:pt x="9536251" y="5960473"/>
-                  <a:pt x="8825600" y="6821583"/>
-                </a:cubicBezTo>
-                <a:lnTo>
-                  <a:pt x="8794055" y="6858000"/>
-                </a:lnTo>
-                <a:lnTo>
-                  <a:pt x="1169096" y="6858000"/>
-                </a:lnTo>
-                <a:lnTo>
-                  <a:pt x="1137550" y="6821583"/>
-                </a:lnTo>
-                <a:cubicBezTo>
-                  <a:pt x="426899" y="5960473"/>
-                  <a:pt x="0" y="4856509"/>
-                  <a:pt x="0" y="3652838"/>
-                </a:cubicBezTo>
-                <a:cubicBezTo>
-                  <a:pt x="0" y="2277214"/>
-                  <a:pt x="557582" y="1031820"/>
-                  <a:pt x="1459070" y="130333"/>
+                <a:cubicBezTo>
+                  <a:pt x="240201" y="-22123"/>
+                  <a:pt x="462021" y="-19623"/>
+                  <a:pt x="618468" y="0"/>
+                </a:cubicBezTo>
+                <a:cubicBezTo>
+                  <a:pt x="774915" y="19623"/>
+                  <a:pt x="974734" y="2035"/>
+                  <a:pt x="1269487" y="0"/>
+                </a:cubicBezTo>
+                <a:cubicBezTo>
+                  <a:pt x="1564240" y="-2035"/>
+                  <a:pt x="1733579" y="10639"/>
+                  <a:pt x="1953057" y="0"/>
+                </a:cubicBezTo>
+                <a:cubicBezTo>
+                  <a:pt x="2172535" y="-10639"/>
+                  <a:pt x="2453962" y="14018"/>
+                  <a:pt x="2636627" y="0"/>
+                </a:cubicBezTo>
+                <a:cubicBezTo>
+                  <a:pt x="2819292" y="-14018"/>
+                  <a:pt x="3121375" y="5399"/>
+                  <a:pt x="3255095" y="0"/>
+                </a:cubicBezTo>
+                <a:cubicBezTo>
+                  <a:pt x="3254386" y="8157"/>
+                  <a:pt x="3254682" y="12125"/>
+                  <a:pt x="3255095" y="18288"/>
+                </a:cubicBezTo>
+                <a:cubicBezTo>
+                  <a:pt x="3088545" y="23203"/>
+                  <a:pt x="2687475" y="7419"/>
+                  <a:pt x="2538974" y="18288"/>
+                </a:cubicBezTo>
+                <a:cubicBezTo>
+                  <a:pt x="2390473" y="29157"/>
+                  <a:pt x="2137381" y="-8959"/>
+                  <a:pt x="1822853" y="18288"/>
+                </a:cubicBezTo>
+                <a:cubicBezTo>
+                  <a:pt x="1508325" y="45535"/>
+                  <a:pt x="1466437" y="20385"/>
+                  <a:pt x="1171834" y="18288"/>
+                </a:cubicBezTo>
+                <a:cubicBezTo>
+                  <a:pt x="877231" y="16191"/>
+                  <a:pt x="561097" y="37643"/>
+                  <a:pt x="0" y="18288"/>
+                </a:cubicBezTo>
+                <a:cubicBezTo>
+                  <a:pt x="-46" y="12483"/>
+                  <a:pt x="-203" y="6491"/>
+                  <a:pt x="0" y="0"/>
+                </a:cubicBezTo>
+                <a:close/>
+              </a:path>
+              <a:path w="3255095" h="18288" stroke="0" extrusionOk="0">
+                <a:moveTo>
+                  <a:pt x="0" y="0"/>
+                </a:moveTo>
+                <a:cubicBezTo>
+                  <a:pt x="291965" y="19429"/>
+                  <a:pt x="363155" y="8568"/>
+                  <a:pt x="618468" y="0"/>
+                </a:cubicBezTo>
+                <a:cubicBezTo>
+                  <a:pt x="873781" y="-8568"/>
+                  <a:pt x="904459" y="-19505"/>
+                  <a:pt x="1171834" y="0"/>
+                </a:cubicBezTo>
+                <a:cubicBezTo>
+                  <a:pt x="1439209" y="19505"/>
+                  <a:pt x="1744369" y="9790"/>
+                  <a:pt x="1887955" y="0"/>
+                </a:cubicBezTo>
+                <a:cubicBezTo>
+                  <a:pt x="2031541" y="-9790"/>
+                  <a:pt x="2346378" y="21240"/>
+                  <a:pt x="2506423" y="0"/>
+                </a:cubicBezTo>
+                <a:cubicBezTo>
+                  <a:pt x="2666468" y="-21240"/>
+                  <a:pt x="2990257" y="30414"/>
+                  <a:pt x="3255095" y="0"/>
+                </a:cubicBezTo>
+                <a:cubicBezTo>
+                  <a:pt x="3254831" y="4493"/>
+                  <a:pt x="3255479" y="9472"/>
+                  <a:pt x="3255095" y="18288"/>
+                </a:cubicBezTo>
+                <a:cubicBezTo>
+                  <a:pt x="3120743" y="16690"/>
+                  <a:pt x="2759628" y="42462"/>
+                  <a:pt x="2604076" y="18288"/>
+                </a:cubicBezTo>
+                <a:cubicBezTo>
+                  <a:pt x="2448524" y="-5886"/>
+                  <a:pt x="2184336" y="19599"/>
+                  <a:pt x="1887955" y="18288"/>
+                </a:cubicBezTo>
+                <a:cubicBezTo>
+                  <a:pt x="1591574" y="16977"/>
+                  <a:pt x="1548845" y="6870"/>
+                  <a:pt x="1334589" y="18288"/>
+                </a:cubicBezTo>
+                <a:cubicBezTo>
+                  <a:pt x="1120333" y="29706"/>
+                  <a:pt x="996014" y="9662"/>
+                  <a:pt x="683570" y="18288"/>
+                </a:cubicBezTo>
+                <a:cubicBezTo>
+                  <a:pt x="371126" y="26914"/>
+                  <a:pt x="198687" y="16167"/>
+                  <a:pt x="0" y="18288"/>
+                </a:cubicBezTo>
+                <a:cubicBezTo>
+                  <a:pt x="843" y="9577"/>
+                  <a:pt x="371" y="6900"/>
+                  <a:pt x="0" y="0"/>
                 </a:cubicBezTo>
                 <a:close/>
               </a:path>
             </a:pathLst>
           </a:custGeom>
-          <a:ln w="9525">
-            <a:solidFill>
-              <a:srgbClr val="EFEFEF"/>
-            </a:solidFill>
-          </a:ln>
-          <a:effectLst>
-            <a:outerShdw blurRad="139700" sx="102000" sy="102000" algn="ctr" rotWithShape="0">
-              <a:schemeClr val="bg1">
-                <a:lumMod val="85000"/>
-                <a:alpha val="38000"/>
-              </a:schemeClr>
-            </a:outerShdw>
-          </a:effectLst>
-        </p:spPr>
-        <p:style>
-          <a:lnRef idx="2">
-            <a:schemeClr val="accent1">
-              <a:shade val="50000"/>
-            </a:schemeClr>
-          </a:lnRef>
-          <a:fillRef idx="1">
-            <a:schemeClr val="accent1"/>
-          </a:fillRef>
-          <a:effectRef idx="0">
-            <a:schemeClr val="accent1"/>
-          </a:effectRef>
-          <a:fontRef idx="minor">
-            <a:schemeClr val="lt1"/>
-          </a:fontRef>
-        </p:style>
-        <p:txBody>
-          <a:bodyPr wrap="square" rtlCol="0" anchor="ctr">
-            <a:noAutofit/>
-          </a:bodyPr>
-          <a:lstStyle/>
-          <a:p>
-            <a:pPr marL="0" marR="0" lvl="0" indent="0" algn="ctr" defTabSz="914400" rtl="0" eaLnBrk="1" fontAlgn="auto" latinLnBrk="0" hangingPunct="1">
-              <a:lnSpc>
-                <a:spcPct val="100000"/>
-              </a:lnSpc>
-              <a:spcBef>
-                <a:spcPts val="0"/>
-              </a:spcBef>
-              <a:spcAft>
-                <a:spcPts val="0"/>
-              </a:spcAft>
-              <a:buClrTx/>
-              <a:buSzTx/>
-              <a:buFontTx/>
-              <a:buNone/>
-              <a:tabLst/>
-              <a:defRPr/>
-            </a:pPr>
-            <a:endParaRPr kumimoji="0" lang="en-US" sz="1800" b="0" i="0" u="none" strike="noStrike" kern="1200" cap="none" spc="0" normalizeH="0" baseline="0" noProof="0">
-              <a:ln>
-                <a:noFill/>
-              </a:ln>
-              <a:solidFill>
-                <a:prstClr val="white"/>
-              </a:solidFill>
-              <a:effectLst/>
-              <a:uLnTx/>
-              <a:uFillTx/>
-              <a:latin typeface="Calibri" panose="020F0502020204030204"/>
-              <a:ea typeface="+mn-ea"/>
-              <a:cs typeface="+mn-cs"/>
-            </a:endParaRPr>
-          </a:p>
-        </p:txBody>
-      </p:sp>
-      <p:sp useBgFill="1">
-        <p:nvSpPr>
-          <p:cNvPr id="11" name="Freeform: Shape 10">
-            <a:extLst>
-              <a:ext uri="{FF2B5EF4-FFF2-40B4-BE49-F238E27FC236}">
-                <a16:creationId xmlns:a16="http://schemas.microsoft.com/office/drawing/2014/main" id="{C7F28D52-2A5F-4D23-81AE-7CB8B591C7AF}"/>
-              </a:ext>
-              <a:ext uri="{C183D7F6-B498-43B3-948B-1728B52AA6E4}">
-                <adec:decorative xmlns:adec="http://schemas.microsoft.com/office/drawing/2017/decorative" val="1"/>
-              </a:ext>
-            </a:extLst>
-          </p:cNvPr>
-          <p:cNvSpPr>
-            <a:spLocks noGrp="1" noRot="1" noChangeAspect="1" noMove="1" noResize="1" noEditPoints="1" noAdjustHandles="1" noChangeArrowheads="1" noChangeShapeType="1" noTextEdit="1"/>
-          </p:cNvSpPr>
-          <p:nvPr>
-            <p:extLst>
-              <p:ext uri="{386F3935-93C4-4BCD-93E2-E3B085C9AB24}">
-                <p16:designElem xmlns:p16="http://schemas.microsoft.com/office/powerpoint/2015/main" val="1"/>
-              </p:ext>
-            </p:extLst>
-          </p:nvPr>
-        </p:nvSpPr>
-        <p:spPr>
-          <a:xfrm>
-            <a:off x="1121664" y="0"/>
-            <a:ext cx="9948672" cy="6858000"/>
-          </a:xfrm>
-          <a:custGeom>
-            <a:avLst/>
-            <a:gdLst>
-              <a:gd name="connsiteX0" fmla="*/ 1595771 w 9963150"/>
-              <a:gd name="connsiteY0" fmla="*/ 0 h 6858000"/>
-              <a:gd name="connsiteX1" fmla="*/ 8367379 w 9963150"/>
-              <a:gd name="connsiteY1" fmla="*/ 0 h 6858000"/>
-              <a:gd name="connsiteX2" fmla="*/ 8504080 w 9963150"/>
-              <a:gd name="connsiteY2" fmla="*/ 130333 h 6858000"/>
-              <a:gd name="connsiteX3" fmla="*/ 9963150 w 9963150"/>
-              <a:gd name="connsiteY3" fmla="*/ 3652838 h 6858000"/>
-              <a:gd name="connsiteX4" fmla="*/ 8825600 w 9963150"/>
-              <a:gd name="connsiteY4" fmla="*/ 6821583 h 6858000"/>
-              <a:gd name="connsiteX5" fmla="*/ 8794055 w 9963150"/>
-              <a:gd name="connsiteY5" fmla="*/ 6858000 h 6858000"/>
-              <a:gd name="connsiteX6" fmla="*/ 1169096 w 9963150"/>
-              <a:gd name="connsiteY6" fmla="*/ 6858000 h 6858000"/>
-              <a:gd name="connsiteX7" fmla="*/ 1137550 w 9963150"/>
-              <a:gd name="connsiteY7" fmla="*/ 6821583 h 6858000"/>
-              <a:gd name="connsiteX8" fmla="*/ 0 w 9963150"/>
-              <a:gd name="connsiteY8" fmla="*/ 3652838 h 6858000"/>
-              <a:gd name="connsiteX9" fmla="*/ 1459070 w 9963150"/>
-              <a:gd name="connsiteY9" fmla="*/ 130333 h 6858000"/>
-            </a:gdLst>
-            <a:ahLst/>
-            <a:cxnLst>
-              <a:cxn ang="0">
-                <a:pos x="connsiteX0" y="connsiteY0"/>
-              </a:cxn>
-              <a:cxn ang="0">
-                <a:pos x="connsiteX1" y="connsiteY1"/>
-              </a:cxn>
-              <a:cxn ang="0">
-                <a:pos x="connsiteX2" y="connsiteY2"/>
-              </a:cxn>
-              <a:cxn ang="0">
-                <a:pos x="connsiteX3" y="connsiteY3"/>
-              </a:cxn>
-              <a:cxn ang="0">
-                <a:pos x="connsiteX4" y="connsiteY4"/>
-              </a:cxn>
-              <a:cxn ang="0">
-                <a:pos x="connsiteX5" y="connsiteY5"/>
-              </a:cxn>
-              <a:cxn ang="0">
-                <a:pos x="connsiteX6" y="connsiteY6"/>
-              </a:cxn>
-              <a:cxn ang="0">
-                <a:pos x="connsiteX7" y="connsiteY7"/>
-              </a:cxn>
-              <a:cxn ang="0">
-                <a:pos x="connsiteX8" y="connsiteY8"/>
-              </a:cxn>
-              <a:cxn ang="0">
-                <a:pos x="connsiteX9" y="connsiteY9"/>
-              </a:cxn>
-            </a:cxnLst>
-            <a:rect l="l" t="t" r="r" b="b"/>
-            <a:pathLst>
-              <a:path w="9963150" h="6858000">
-                <a:moveTo>
-                  <a:pt x="1595771" y="0"/>
-                </a:moveTo>
-                <a:lnTo>
-                  <a:pt x="8367379" y="0"/>
-                </a:lnTo>
-                <a:lnTo>
-                  <a:pt x="8504080" y="130333"/>
-                </a:lnTo>
-                <a:cubicBezTo>
-                  <a:pt x="9405568" y="1031820"/>
-                  <a:pt x="9963150" y="2277214"/>
-                  <a:pt x="9963150" y="3652838"/>
-                </a:cubicBezTo>
-                <a:cubicBezTo>
-                  <a:pt x="9963150" y="4856509"/>
-                  <a:pt x="9536251" y="5960473"/>
-                  <a:pt x="8825600" y="6821583"/>
-                </a:cubicBezTo>
-                <a:lnTo>
-                  <a:pt x="8794055" y="6858000"/>
-                </a:lnTo>
-                <a:lnTo>
-                  <a:pt x="1169096" y="6858000"/>
-                </a:lnTo>
-                <a:lnTo>
-                  <a:pt x="1137550" y="6821583"/>
-                </a:lnTo>
-                <a:cubicBezTo>
-                  <a:pt x="426899" y="5960473"/>
-                  <a:pt x="0" y="4856509"/>
-                  <a:pt x="0" y="3652838"/>
-                </a:cubicBezTo>
-                <a:cubicBezTo>
-                  <a:pt x="0" y="2277214"/>
-                  <a:pt x="557582" y="1031820"/>
-                  <a:pt x="1459070" y="130333"/>
-                </a:cubicBezTo>
-                <a:close/>
-              </a:path>
-            </a:pathLst>
-          </a:custGeom>
-          <a:ln w="9525">
-            <a:noFill/>
-          </a:ln>
-          <a:effectLst/>
-        </p:spPr>
-        <p:style>
-          <a:lnRef idx="2">
-            <a:schemeClr val="accent1">
-              <a:shade val="50000"/>
-            </a:schemeClr>
-          </a:lnRef>
-          <a:fillRef idx="1">
-            <a:schemeClr val="accent1"/>
-          </a:fillRef>
-          <a:effectRef idx="0">
-            <a:schemeClr val="accent1"/>
-          </a:effectRef>
-          <a:fontRef idx="minor">
-            <a:schemeClr val="lt1"/>
-          </a:fontRef>
-        </p:style>
-        <p:txBody>
-          <a:bodyPr wrap="square" rtlCol="0" anchor="ctr">
-            <a:noAutofit/>
-          </a:bodyPr>
-          <a:lstStyle/>
-          <a:p>
-            <a:pPr marL="0" marR="0" lvl="0" indent="0" algn="ctr" defTabSz="914400" rtl="0" eaLnBrk="1" fontAlgn="auto" latinLnBrk="0" hangingPunct="1">
-              <a:lnSpc>
-                <a:spcPct val="100000"/>
-              </a:lnSpc>
-              <a:spcBef>
-                <a:spcPts val="0"/>
-              </a:spcBef>
-              <a:spcAft>
-                <a:spcPts val="0"/>
-              </a:spcAft>
-              <a:buClrTx/>
-              <a:buSzTx/>
-              <a:buFontTx/>
-              <a:buNone/>
-              <a:tabLst/>
-              <a:defRPr/>
-            </a:pPr>
-            <a:endParaRPr kumimoji="0" lang="en-US" sz="1800" b="0" i="0" u="none" strike="noStrike" kern="1200" cap="none" spc="0" normalizeH="0" baseline="0" noProof="0">
-              <a:ln>
-                <a:noFill/>
-              </a:ln>
-              <a:solidFill>
-                <a:prstClr val="white"/>
-              </a:solidFill>
-              <a:effectLst/>
-              <a:uLnTx/>
-              <a:uFillTx/>
-              <a:latin typeface="Calibri" panose="020F0502020204030204"/>
-              <a:ea typeface="+mn-ea"/>
-              <a:cs typeface="+mn-cs"/>
-            </a:endParaRPr>
-          </a:p>
-        </p:txBody>
-      </p:sp>
-      <p:sp>
-        <p:nvSpPr>
-          <p:cNvPr id="2" name="Заголовок 1">
-            <a:extLst>
-              <a:ext uri="{FF2B5EF4-FFF2-40B4-BE49-F238E27FC236}">
-                <a16:creationId xmlns:a16="http://schemas.microsoft.com/office/drawing/2014/main" id="{EF867D5F-8842-00AE-AA95-6DDBCB7E8EEB}"/>
-              </a:ext>
-            </a:extLst>
-          </p:cNvPr>
-          <p:cNvSpPr>
-            <a:spLocks noGrp="1"/>
-          </p:cNvSpPr>
-          <p:nvPr>
-            <p:ph type="title"/>
-          </p:nvPr>
-        </p:nvSpPr>
-        <p:spPr>
-          <a:xfrm>
-            <a:off x="1524003" y="1999615"/>
-            <a:ext cx="9144000" cy="2764028"/>
-          </a:xfrm>
-        </p:spPr>
-        <p:txBody>
-          <a:bodyPr vert="horz" lIns="91440" tIns="45720" rIns="91440" bIns="45720" rtlCol="0" anchor="ctr">
-            <a:normAutofit/>
-          </a:bodyPr>
-          <a:lstStyle/>
-          <a:p>
-            <a:pPr algn="ctr"/>
-            <a:r>
-              <a:rPr lang="en-US" sz="7200" kern="1200">
-                <a:solidFill>
-                  <a:schemeClr val="tx1"/>
-                </a:solidFill>
-                <a:latin typeface="+mj-lt"/>
-                <a:ea typeface="+mj-ea"/>
-                <a:cs typeface="+mj-cs"/>
-              </a:rPr>
-              <a:t>Дякую за увагу</a:t>
-            </a:r>
-          </a:p>
-        </p:txBody>
-      </p:sp>
-      <p:sp>
-        <p:nvSpPr>
-          <p:cNvPr id="13" name="Rectangle 12">
-            <a:extLst>
-              <a:ext uri="{FF2B5EF4-FFF2-40B4-BE49-F238E27FC236}">
-                <a16:creationId xmlns:a16="http://schemas.microsoft.com/office/drawing/2014/main" id="{3629484E-3792-4B3D-89AD-7C8A1ED0E0D4}"/>
-              </a:ext>
-              <a:ext uri="{C183D7F6-B498-43B3-948B-1728B52AA6E4}">
-                <adec:decorative xmlns:adec="http://schemas.microsoft.com/office/drawing/2017/decorative" val="1"/>
-              </a:ext>
-            </a:extLst>
-          </p:cNvPr>
-          <p:cNvSpPr>
-            <a:spLocks noGrp="1" noRot="1" noChangeAspect="1" noMove="1" noResize="1" noEditPoints="1" noAdjustHandles="1" noChangeArrowheads="1" noChangeShapeType="1" noTextEdit="1"/>
-          </p:cNvSpPr>
-          <p:nvPr>
-            <p:extLst>
-              <p:ext uri="{386F3935-93C4-4BCD-93E2-E3B085C9AB24}">
-                <p16:designElem xmlns:p16="http://schemas.microsoft.com/office/powerpoint/2015/main" val="1"/>
-              </p:ext>
-            </p:extLst>
-          </p:nvPr>
-        </p:nvSpPr>
-        <p:spPr>
-          <a:xfrm>
-            <a:off x="3718560" y="5524786"/>
-            <a:ext cx="4754880" cy="27432"/>
-          </a:xfrm>
-          <a:prstGeom prst="rect">
-            <a:avLst/>
-          </a:prstGeom>
           <a:solidFill>
             <a:schemeClr val="accent2"/>
           </a:solidFill>
-          <a:ln>
-            <a:noFill/>
+          <a:ln w="38100" cap="rnd">
+            <a:solidFill>
+              <a:schemeClr val="accent2"/>
+            </a:solidFill>
+            <a:round/>
+            <a:extLst>
+              <a:ext uri="{C807C97D-BFC1-408E-A445-0C87EB9F89A2}">
+                <ask:lineSketchStyleProps xmlns:ask="http://schemas.microsoft.com/office/drawing/2018/sketchyshapes" sd="1219033472">
+                  <a:prstGeom prst="rect">
+                    <a:avLst/>
+                  </a:prstGeom>
+                  <ask:type>
+                    <ask:lineSketchFreehand/>
+                  </ask:type>
+                </ask:lineSketchStyleProps>
+              </a:ext>
+            </a:extLst>
           </a:ln>
         </p:spPr>
         <p:style>
@@ -10471,40 +10353,91 @@
           <a:bodyPr rtlCol="0" anchor="ctr"/>
           <a:lstStyle/>
           <a:p>
-            <a:pPr marL="0" marR="0" lvl="0" indent="0" algn="ctr" defTabSz="914400" rtl="0" eaLnBrk="1" fontAlgn="auto" latinLnBrk="0" hangingPunct="1">
-              <a:lnSpc>
-                <a:spcPct val="100000"/>
-              </a:lnSpc>
-              <a:spcBef>
-                <a:spcPts val="0"/>
-              </a:spcBef>
-              <a:spcAft>
-                <a:spcPts val="0"/>
-              </a:spcAft>
-              <a:buClrTx/>
-              <a:buSzTx/>
-              <a:buFontTx/>
-              <a:buNone/>
-              <a:tabLst/>
-              <a:defRPr/>
-            </a:pPr>
-            <a:endParaRPr kumimoji="0" lang="en-US" sz="1800" b="0" i="0" u="none" strike="noStrike" kern="1200" cap="none" spc="0" normalizeH="0" baseline="0" noProof="0">
-              <a:ln>
-                <a:noFill/>
-              </a:ln>
-              <a:solidFill>
-                <a:prstClr val="white"/>
-              </a:solidFill>
-              <a:effectLst/>
-              <a:uLnTx/>
-              <a:uFillTx/>
-              <a:latin typeface="Calibri" panose="020F0502020204030204"/>
-              <a:ea typeface="+mn-ea"/>
-              <a:cs typeface="+mn-cs"/>
-            </a:endParaRPr>
+            <a:pPr algn="ctr"/>
+            <a:endParaRPr lang="en-US"/>
           </a:p>
         </p:txBody>
       </p:sp>
+      <p:sp>
+        <p:nvSpPr>
+          <p:cNvPr id="6" name="TextBox 5">
+            <a:extLst>
+              <a:ext uri="{FF2B5EF4-FFF2-40B4-BE49-F238E27FC236}">
+                <a16:creationId xmlns:a16="http://schemas.microsoft.com/office/drawing/2014/main" id="{5708AFCB-BFB0-9917-8879-A81EE37D3572}"/>
+              </a:ext>
+            </a:extLst>
+          </p:cNvPr>
+          <p:cNvSpPr txBox="1"/>
+          <p:nvPr/>
+        </p:nvSpPr>
+        <p:spPr>
+          <a:xfrm>
+            <a:off x="630936" y="2660904"/>
+            <a:ext cx="4818888" cy="3547872"/>
+          </a:xfrm>
+          <a:prstGeom prst="rect">
+            <a:avLst/>
+          </a:prstGeom>
+        </p:spPr>
+        <p:txBody>
+          <a:bodyPr vert="horz" lIns="91440" tIns="45720" rIns="91440" bIns="45720" rtlCol="0" anchor="t">
+            <a:normAutofit/>
+          </a:bodyPr>
+          <a:lstStyle/>
+          <a:p>
+            <a:pPr indent="-228600">
+              <a:lnSpc>
+                <a:spcPct val="90000"/>
+              </a:lnSpc>
+              <a:spcAft>
+                <a:spcPts val="600"/>
+              </a:spcAft>
+              <a:buFont typeface="Arial" panose="020B0604020202020204" pitchFamily="34" charset="0"/>
+              <a:buChar char="•"/>
+            </a:pPr>
+            <a:r>
+              <a:rPr lang="en-US" sz="2200"/>
+              <a:t>Проект курсової на GitHub.com</a:t>
+            </a:r>
+          </a:p>
+        </p:txBody>
+      </p:sp>
+      <p:pic>
+        <p:nvPicPr>
+          <p:cNvPr id="5" name="Рисунок 4" descr="Изображение выглядит как шаблон, прямоугольный, дизайн, искусство&#10;&#10;Автоматически созданное описание">
+            <a:extLst>
+              <a:ext uri="{FF2B5EF4-FFF2-40B4-BE49-F238E27FC236}">
+                <a16:creationId xmlns:a16="http://schemas.microsoft.com/office/drawing/2014/main" id="{0EC74EC0-85CC-5874-5185-8AA0EC5E89CA}"/>
+              </a:ext>
+            </a:extLst>
+          </p:cNvPr>
+          <p:cNvPicPr>
+            <a:picLocks noChangeAspect="1"/>
+          </p:cNvPicPr>
+          <p:nvPr/>
+        </p:nvPicPr>
+        <p:blipFill>
+          <a:blip r:embed="rId2">
+            <a:extLst>
+              <a:ext uri="{28A0092B-C50C-407E-A947-70E740481C1C}">
+                <a14:useLocalDpi xmlns:a14="http://schemas.microsoft.com/office/drawing/2010/main" val="0"/>
+              </a:ext>
+            </a:extLst>
+          </a:blip>
+          <a:stretch>
+            <a:fillRect/>
+          </a:stretch>
+        </p:blipFill>
+        <p:spPr>
+          <a:xfrm>
+            <a:off x="6099048" y="699516"/>
+            <a:ext cx="5458968" cy="5458968"/>
+          </a:xfrm>
+          <a:prstGeom prst="rect">
+            <a:avLst/>
+          </a:prstGeom>
+        </p:spPr>
+      </p:pic>
     </p:spTree>
     <p:extLst>
       <p:ext uri="{BB962C8B-B14F-4D97-AF65-F5344CB8AC3E}">

</xml_diff>